<commit_message>
Update English specs for easier chip naming
</commit_message>
<xml_diff>
--- a/Specification/English/Editable source images/Images Spec Part 7 - Other console components.pptx
+++ b/Specification/English/Editable source images/Images Spec Part 7 - Other console components.pptx
@@ -198,7 +198,7 @@
             <a:fld id="{C7513EA5-A849-481D-9314-2474C49C58C3}" type="datetimeFigureOut">
               <a:rPr lang="es-ES" smtClean="0"/>
               <a:pPr/>
-              <a:t>26/12/2022</a:t>
+              <a:t>06/01/2024</a:t>
             </a:fld>
             <a:endParaRPr lang="es-ES"/>
           </a:p>
@@ -728,7 +728,7 @@
             <a:fld id="{1762487E-E677-4519-9D9B-00832401FE8D}" type="datetimeFigureOut">
               <a:rPr lang="es-ES" smtClean="0"/>
               <a:pPr/>
-              <a:t>26/12/2022</a:t>
+              <a:t>06/01/2024</a:t>
             </a:fld>
             <a:endParaRPr lang="es-ES"/>
           </a:p>
@@ -895,7 +895,7 @@
             <a:fld id="{1762487E-E677-4519-9D9B-00832401FE8D}" type="datetimeFigureOut">
               <a:rPr lang="es-ES" smtClean="0"/>
               <a:pPr/>
-              <a:t>26/12/2022</a:t>
+              <a:t>06/01/2024</a:t>
             </a:fld>
             <a:endParaRPr lang="es-ES"/>
           </a:p>
@@ -1072,7 +1072,7 @@
             <a:fld id="{1762487E-E677-4519-9D9B-00832401FE8D}" type="datetimeFigureOut">
               <a:rPr lang="es-ES" smtClean="0"/>
               <a:pPr/>
-              <a:t>26/12/2022</a:t>
+              <a:t>06/01/2024</a:t>
             </a:fld>
             <a:endParaRPr lang="es-ES"/>
           </a:p>
@@ -1239,7 +1239,7 @@
             <a:fld id="{1762487E-E677-4519-9D9B-00832401FE8D}" type="datetimeFigureOut">
               <a:rPr lang="es-ES" smtClean="0"/>
               <a:pPr/>
-              <a:t>26/12/2022</a:t>
+              <a:t>06/01/2024</a:t>
             </a:fld>
             <a:endParaRPr lang="es-ES"/>
           </a:p>
@@ -1482,7 +1482,7 @@
             <a:fld id="{1762487E-E677-4519-9D9B-00832401FE8D}" type="datetimeFigureOut">
               <a:rPr lang="es-ES" smtClean="0"/>
               <a:pPr/>
-              <a:t>26/12/2022</a:t>
+              <a:t>06/01/2024</a:t>
             </a:fld>
             <a:endParaRPr lang="es-ES"/>
           </a:p>
@@ -1767,7 +1767,7 @@
             <a:fld id="{1762487E-E677-4519-9D9B-00832401FE8D}" type="datetimeFigureOut">
               <a:rPr lang="es-ES" smtClean="0"/>
               <a:pPr/>
-              <a:t>26/12/2022</a:t>
+              <a:t>06/01/2024</a:t>
             </a:fld>
             <a:endParaRPr lang="es-ES"/>
           </a:p>
@@ -2191,7 +2191,7 @@
             <a:fld id="{1762487E-E677-4519-9D9B-00832401FE8D}" type="datetimeFigureOut">
               <a:rPr lang="es-ES" smtClean="0"/>
               <a:pPr/>
-              <a:t>26/12/2022</a:t>
+              <a:t>06/01/2024</a:t>
             </a:fld>
             <a:endParaRPr lang="es-ES"/>
           </a:p>
@@ -2306,7 +2306,7 @@
             <a:fld id="{1762487E-E677-4519-9D9B-00832401FE8D}" type="datetimeFigureOut">
               <a:rPr lang="es-ES" smtClean="0"/>
               <a:pPr/>
-              <a:t>26/12/2022</a:t>
+              <a:t>06/01/2024</a:t>
             </a:fld>
             <a:endParaRPr lang="es-ES"/>
           </a:p>
@@ -2398,7 +2398,7 @@
             <a:fld id="{1762487E-E677-4519-9D9B-00832401FE8D}" type="datetimeFigureOut">
               <a:rPr lang="es-ES" smtClean="0"/>
               <a:pPr/>
-              <a:t>26/12/2022</a:t>
+              <a:t>06/01/2024</a:t>
             </a:fld>
             <a:endParaRPr lang="es-ES"/>
           </a:p>
@@ -2672,7 +2672,7 @@
             <a:fld id="{1762487E-E677-4519-9D9B-00832401FE8D}" type="datetimeFigureOut">
               <a:rPr lang="es-ES" smtClean="0"/>
               <a:pPr/>
-              <a:t>26/12/2022</a:t>
+              <a:t>06/01/2024</a:t>
             </a:fld>
             <a:endParaRPr lang="es-ES"/>
           </a:p>
@@ -2922,7 +2922,7 @@
             <a:fld id="{1762487E-E677-4519-9D9B-00832401FE8D}" type="datetimeFigureOut">
               <a:rPr lang="es-ES" smtClean="0"/>
               <a:pPr/>
-              <a:t>26/12/2022</a:t>
+              <a:t>06/01/2024</a:t>
             </a:fld>
             <a:endParaRPr lang="es-ES"/>
           </a:p>
@@ -3135,7 +3135,7 @@
             <a:fld id="{1762487E-E677-4519-9D9B-00832401FE8D}" type="datetimeFigureOut">
               <a:rPr lang="es-ES" smtClean="0"/>
               <a:pPr/>
-              <a:t>26/12/2022</a:t>
+              <a:t>06/01/2024</a:t>
             </a:fld>
             <a:endParaRPr lang="es-ES"/>
           </a:p>
@@ -4778,7 +4778,7 @@
                   <a:srgbClr val="C00000"/>
                 </a:solidFill>
               </a:rPr>
-              <a:t>RAM</a:t>
+              <a:t>RAM Chip</a:t>
             </a:r>
             <a:endParaRPr lang="es-ES" sz="1600" b="1">
               <a:solidFill>
@@ -5181,7 +5181,7 @@
                   <a:srgbClr val="C00000"/>
                 </a:solidFill>
               </a:rPr>
-              <a:t>BIOS</a:t>
+              <a:t>BIOS Chip</a:t>
             </a:r>
             <a:endParaRPr lang="es-ES" sz="1600" b="1">
               <a:solidFill>
@@ -5812,7 +5812,7 @@
           <p:cNvPr id="86" name="Rectángulo 85">
             <a:extLst>
               <a:ext uri="{FF2B5EF4-FFF2-40B4-BE49-F238E27FC236}">
-                <a16:creationId xmlns="" xmlns:a16="http://schemas.microsoft.com/office/drawing/2014/main" id="{D136B626-B99A-4919-8609-F0DA15C64A07}"/>
+                <a16:creationId xmlns:a16="http://schemas.microsoft.com/office/drawing/2014/main" xmlns="" id="{D136B626-B99A-4919-8609-F0DA15C64A07}"/>
               </a:ext>
             </a:extLst>
           </p:cNvPr>
@@ -5864,7 +5864,7 @@
           <p:cNvPr id="88" name="Rectángulo 87">
             <a:extLst>
               <a:ext uri="{FF2B5EF4-FFF2-40B4-BE49-F238E27FC236}">
-                <a16:creationId xmlns="" xmlns:a16="http://schemas.microsoft.com/office/drawing/2014/main" id="{1D5C81C2-3A8D-4B79-84C3-767501CFBACA}"/>
+                <a16:creationId xmlns:a16="http://schemas.microsoft.com/office/drawing/2014/main" xmlns="" id="{1D5C81C2-3A8D-4B79-84C3-767501CFBACA}"/>
               </a:ext>
             </a:extLst>
           </p:cNvPr>
@@ -5916,7 +5916,7 @@
           <p:cNvPr id="90" name="Rectángulo 89">
             <a:extLst>
               <a:ext uri="{FF2B5EF4-FFF2-40B4-BE49-F238E27FC236}">
-                <a16:creationId xmlns="" xmlns:a16="http://schemas.microsoft.com/office/drawing/2014/main" id="{3561981F-4785-4A09-8181-E0BC6A56A32D}"/>
+                <a16:creationId xmlns:a16="http://schemas.microsoft.com/office/drawing/2014/main" xmlns="" id="{3561981F-4785-4A09-8181-E0BC6A56A32D}"/>
               </a:ext>
             </a:extLst>
           </p:cNvPr>
@@ -5968,7 +5968,7 @@
           <p:cNvPr id="92" name="Rectángulo 91">
             <a:extLst>
               <a:ext uri="{FF2B5EF4-FFF2-40B4-BE49-F238E27FC236}">
-                <a16:creationId xmlns="" xmlns:a16="http://schemas.microsoft.com/office/drawing/2014/main" id="{BC1258C2-8AC5-44BE-A819-DA652F727394}"/>
+                <a16:creationId xmlns:a16="http://schemas.microsoft.com/office/drawing/2014/main" xmlns="" id="{BC1258C2-8AC5-44BE-A819-DA652F727394}"/>
               </a:ext>
             </a:extLst>
           </p:cNvPr>
@@ -6020,7 +6020,7 @@
           <p:cNvPr id="94" name="Rectángulo 93">
             <a:extLst>
               <a:ext uri="{FF2B5EF4-FFF2-40B4-BE49-F238E27FC236}">
-                <a16:creationId xmlns="" xmlns:a16="http://schemas.microsoft.com/office/drawing/2014/main" id="{09FA9F8B-4F70-4843-9EAC-9A6B1124B191}"/>
+                <a16:creationId xmlns:a16="http://schemas.microsoft.com/office/drawing/2014/main" xmlns="" id="{09FA9F8B-4F70-4843-9EAC-9A6B1124B191}"/>
               </a:ext>
             </a:extLst>
           </p:cNvPr>
@@ -6072,7 +6072,7 @@
           <p:cNvPr id="96" name="Rectángulo 95">
             <a:extLst>
               <a:ext uri="{FF2B5EF4-FFF2-40B4-BE49-F238E27FC236}">
-                <a16:creationId xmlns="" xmlns:a16="http://schemas.microsoft.com/office/drawing/2014/main" id="{BDE75ADB-62F6-4B06-A8C8-48FFC0734776}"/>
+                <a16:creationId xmlns:a16="http://schemas.microsoft.com/office/drawing/2014/main" xmlns="" id="{BDE75ADB-62F6-4B06-A8C8-48FFC0734776}"/>
               </a:ext>
             </a:extLst>
           </p:cNvPr>
@@ -6124,7 +6124,7 @@
           <p:cNvPr id="98" name="Rectángulo 97">
             <a:extLst>
               <a:ext uri="{FF2B5EF4-FFF2-40B4-BE49-F238E27FC236}">
-                <a16:creationId xmlns="" xmlns:a16="http://schemas.microsoft.com/office/drawing/2014/main" id="{CE8D17C1-C2A2-4D3F-9B83-195AFB3C969B}"/>
+                <a16:creationId xmlns:a16="http://schemas.microsoft.com/office/drawing/2014/main" xmlns="" id="{CE8D17C1-C2A2-4D3F-9B83-195AFB3C969B}"/>
               </a:ext>
             </a:extLst>
           </p:cNvPr>
@@ -6176,7 +6176,7 @@
           <p:cNvPr id="100" name="Rectángulo 99">
             <a:extLst>
               <a:ext uri="{FF2B5EF4-FFF2-40B4-BE49-F238E27FC236}">
-                <a16:creationId xmlns="" xmlns:a16="http://schemas.microsoft.com/office/drawing/2014/main" id="{3BEECC94-5FF0-48DA-BCEC-E87CA93FD03A}"/>
+                <a16:creationId xmlns:a16="http://schemas.microsoft.com/office/drawing/2014/main" xmlns="" id="{3BEECC94-5FF0-48DA-BCEC-E87CA93FD03A}"/>
               </a:ext>
             </a:extLst>
           </p:cNvPr>
@@ -6228,7 +6228,7 @@
           <p:cNvPr id="101" name="Rectángulo 100">
             <a:extLst>
               <a:ext uri="{FF2B5EF4-FFF2-40B4-BE49-F238E27FC236}">
-                <a16:creationId xmlns="" xmlns:a16="http://schemas.microsoft.com/office/drawing/2014/main" id="{5AF5D5E5-FA6F-48E1-AEEC-C2D0AFCABAD3}"/>
+                <a16:creationId xmlns:a16="http://schemas.microsoft.com/office/drawing/2014/main" xmlns="" id="{5AF5D5E5-FA6F-48E1-AEEC-C2D0AFCABAD3}"/>
               </a:ext>
             </a:extLst>
           </p:cNvPr>
@@ -6280,7 +6280,7 @@
           <p:cNvPr id="108" name="Rectángulo 107">
             <a:extLst>
               <a:ext uri="{FF2B5EF4-FFF2-40B4-BE49-F238E27FC236}">
-                <a16:creationId xmlns="" xmlns:a16="http://schemas.microsoft.com/office/drawing/2014/main" id="{FC54B5E4-BD6D-47B2-A73F-551173B6F644}"/>
+                <a16:creationId xmlns:a16="http://schemas.microsoft.com/office/drawing/2014/main" xmlns="" id="{FC54B5E4-BD6D-47B2-A73F-551173B6F644}"/>
               </a:ext>
             </a:extLst>
           </p:cNvPr>
@@ -6332,7 +6332,7 @@
           <p:cNvPr id="111" name="Rectángulo 110">
             <a:extLst>
               <a:ext uri="{FF2B5EF4-FFF2-40B4-BE49-F238E27FC236}">
-                <a16:creationId xmlns="" xmlns:a16="http://schemas.microsoft.com/office/drawing/2014/main" id="{A01D818C-C207-48AE-B849-41C661FD0762}"/>
+                <a16:creationId xmlns:a16="http://schemas.microsoft.com/office/drawing/2014/main" xmlns="" id="{A01D818C-C207-48AE-B849-41C661FD0762}"/>
               </a:ext>
             </a:extLst>
           </p:cNvPr>
@@ -6384,7 +6384,7 @@
           <p:cNvPr id="113" name="Rectángulo 112">
             <a:extLst>
               <a:ext uri="{FF2B5EF4-FFF2-40B4-BE49-F238E27FC236}">
-                <a16:creationId xmlns="" xmlns:a16="http://schemas.microsoft.com/office/drawing/2014/main" id="{925158CF-29ED-4A4A-B3AF-C72B5B7BB7EC}"/>
+                <a16:creationId xmlns:a16="http://schemas.microsoft.com/office/drawing/2014/main" xmlns="" id="{925158CF-29ED-4A4A-B3AF-C72B5B7BB7EC}"/>
               </a:ext>
             </a:extLst>
           </p:cNvPr>
@@ -6436,7 +6436,7 @@
           <p:cNvPr id="115" name="Rectángulo 114">
             <a:extLst>
               <a:ext uri="{FF2B5EF4-FFF2-40B4-BE49-F238E27FC236}">
-                <a16:creationId xmlns="" xmlns:a16="http://schemas.microsoft.com/office/drawing/2014/main" id="{499E038A-214A-49F9-8103-A9A3A620F489}"/>
+                <a16:creationId xmlns:a16="http://schemas.microsoft.com/office/drawing/2014/main" xmlns="" id="{499E038A-214A-49F9-8103-A9A3A620F489}"/>
               </a:ext>
             </a:extLst>
           </p:cNvPr>
@@ -6488,7 +6488,7 @@
           <p:cNvPr id="117" name="Rectángulo 116">
             <a:extLst>
               <a:ext uri="{FF2B5EF4-FFF2-40B4-BE49-F238E27FC236}">
-                <a16:creationId xmlns="" xmlns:a16="http://schemas.microsoft.com/office/drawing/2014/main" id="{0664541E-0833-4A5E-A8EF-5A3FCF77F63E}"/>
+                <a16:creationId xmlns:a16="http://schemas.microsoft.com/office/drawing/2014/main" xmlns="" id="{0664541E-0833-4A5E-A8EF-5A3FCF77F63E}"/>
               </a:ext>
             </a:extLst>
           </p:cNvPr>
@@ -6540,7 +6540,7 @@
           <p:cNvPr id="120" name="Rectángulo 119">
             <a:extLst>
               <a:ext uri="{FF2B5EF4-FFF2-40B4-BE49-F238E27FC236}">
-                <a16:creationId xmlns="" xmlns:a16="http://schemas.microsoft.com/office/drawing/2014/main" id="{79D68643-0A1E-495E-80FB-534377898035}"/>
+                <a16:creationId xmlns:a16="http://schemas.microsoft.com/office/drawing/2014/main" xmlns="" id="{79D68643-0A1E-495E-80FB-534377898035}"/>
               </a:ext>
             </a:extLst>
           </p:cNvPr>
@@ -6592,7 +6592,7 @@
           <p:cNvPr id="127" name="Rectángulo 126">
             <a:extLst>
               <a:ext uri="{FF2B5EF4-FFF2-40B4-BE49-F238E27FC236}">
-                <a16:creationId xmlns="" xmlns:a16="http://schemas.microsoft.com/office/drawing/2014/main" id="{E7BD9940-F968-4B8B-8CF6-01F0F9A79FC5}"/>
+                <a16:creationId xmlns:a16="http://schemas.microsoft.com/office/drawing/2014/main" xmlns="" id="{E7BD9940-F968-4B8B-8CF6-01F0F9A79FC5}"/>
               </a:ext>
             </a:extLst>
           </p:cNvPr>
@@ -6644,7 +6644,7 @@
           <p:cNvPr id="128" name="Rectángulo 127">
             <a:extLst>
               <a:ext uri="{FF2B5EF4-FFF2-40B4-BE49-F238E27FC236}">
-                <a16:creationId xmlns="" xmlns:a16="http://schemas.microsoft.com/office/drawing/2014/main" id="{9A111A93-0EBA-486F-9846-8B244017B371}"/>
+                <a16:creationId xmlns:a16="http://schemas.microsoft.com/office/drawing/2014/main" xmlns="" id="{9A111A93-0EBA-486F-9846-8B244017B371}"/>
               </a:ext>
             </a:extLst>
           </p:cNvPr>
@@ -6696,7 +6696,7 @@
           <p:cNvPr id="129" name="Rectángulo 128">
             <a:extLst>
               <a:ext uri="{FF2B5EF4-FFF2-40B4-BE49-F238E27FC236}">
-                <a16:creationId xmlns="" xmlns:a16="http://schemas.microsoft.com/office/drawing/2014/main" id="{2EDC590C-B79B-4455-B21A-E52CD413002F}"/>
+                <a16:creationId xmlns:a16="http://schemas.microsoft.com/office/drawing/2014/main" xmlns="" id="{2EDC590C-B79B-4455-B21A-E52CD413002F}"/>
               </a:ext>
             </a:extLst>
           </p:cNvPr>
@@ -6748,7 +6748,7 @@
           <p:cNvPr id="130" name="Rectángulo 129">
             <a:extLst>
               <a:ext uri="{FF2B5EF4-FFF2-40B4-BE49-F238E27FC236}">
-                <a16:creationId xmlns="" xmlns:a16="http://schemas.microsoft.com/office/drawing/2014/main" id="{BFE52AF6-0715-45AA-BE61-460045DFF830}"/>
+                <a16:creationId xmlns:a16="http://schemas.microsoft.com/office/drawing/2014/main" xmlns="" id="{BFE52AF6-0715-45AA-BE61-460045DFF830}"/>
               </a:ext>
             </a:extLst>
           </p:cNvPr>
@@ -6800,7 +6800,7 @@
           <p:cNvPr id="131" name="Rectángulo 130">
             <a:extLst>
               <a:ext uri="{FF2B5EF4-FFF2-40B4-BE49-F238E27FC236}">
-                <a16:creationId xmlns="" xmlns:a16="http://schemas.microsoft.com/office/drawing/2014/main" id="{ABD5847F-75F1-4799-9544-668E918A0AC5}"/>
+                <a16:creationId xmlns:a16="http://schemas.microsoft.com/office/drawing/2014/main" xmlns="" id="{ABD5847F-75F1-4799-9544-668E918A0AC5}"/>
               </a:ext>
             </a:extLst>
           </p:cNvPr>
@@ -6852,7 +6852,7 @@
           <p:cNvPr id="132" name="Rectángulo 131">
             <a:extLst>
               <a:ext uri="{FF2B5EF4-FFF2-40B4-BE49-F238E27FC236}">
-                <a16:creationId xmlns="" xmlns:a16="http://schemas.microsoft.com/office/drawing/2014/main" id="{8B57A71E-4CB6-4D59-94FC-2987F4485F43}"/>
+                <a16:creationId xmlns:a16="http://schemas.microsoft.com/office/drawing/2014/main" xmlns="" id="{8B57A71E-4CB6-4D59-94FC-2987F4485F43}"/>
               </a:ext>
             </a:extLst>
           </p:cNvPr>
@@ -6904,7 +6904,7 @@
           <p:cNvPr id="133" name="Rectángulo 132">
             <a:extLst>
               <a:ext uri="{FF2B5EF4-FFF2-40B4-BE49-F238E27FC236}">
-                <a16:creationId xmlns="" xmlns:a16="http://schemas.microsoft.com/office/drawing/2014/main" id="{852973DA-04D7-48FC-8EEF-735C27611E8E}"/>
+                <a16:creationId xmlns:a16="http://schemas.microsoft.com/office/drawing/2014/main" xmlns="" id="{852973DA-04D7-48FC-8EEF-735C27611E8E}"/>
               </a:ext>
             </a:extLst>
           </p:cNvPr>
@@ -6956,7 +6956,7 @@
           <p:cNvPr id="134" name="Rectángulo 133">
             <a:extLst>
               <a:ext uri="{FF2B5EF4-FFF2-40B4-BE49-F238E27FC236}">
-                <a16:creationId xmlns="" xmlns:a16="http://schemas.microsoft.com/office/drawing/2014/main" id="{722DFA65-C143-4D0A-94F4-305BA1B1E318}"/>
+                <a16:creationId xmlns:a16="http://schemas.microsoft.com/office/drawing/2014/main" xmlns="" id="{722DFA65-C143-4D0A-94F4-305BA1B1E318}"/>
               </a:ext>
             </a:extLst>
           </p:cNvPr>
@@ -7008,7 +7008,7 @@
           <p:cNvPr id="135" name="Rectángulo 134">
             <a:extLst>
               <a:ext uri="{FF2B5EF4-FFF2-40B4-BE49-F238E27FC236}">
-                <a16:creationId xmlns="" xmlns:a16="http://schemas.microsoft.com/office/drawing/2014/main" id="{05562AE3-F2A7-4FE9-BCD7-055717A12BA2}"/>
+                <a16:creationId xmlns:a16="http://schemas.microsoft.com/office/drawing/2014/main" xmlns="" id="{05562AE3-F2A7-4FE9-BCD7-055717A12BA2}"/>
               </a:ext>
             </a:extLst>
           </p:cNvPr>
@@ -7060,7 +7060,7 @@
           <p:cNvPr id="136" name="Rectángulo 135">
             <a:extLst>
               <a:ext uri="{FF2B5EF4-FFF2-40B4-BE49-F238E27FC236}">
-                <a16:creationId xmlns="" xmlns:a16="http://schemas.microsoft.com/office/drawing/2014/main" id="{45204B18-3348-4086-8A71-A0A62EB4C662}"/>
+                <a16:creationId xmlns:a16="http://schemas.microsoft.com/office/drawing/2014/main" xmlns="" id="{45204B18-3348-4086-8A71-A0A62EB4C662}"/>
               </a:ext>
             </a:extLst>
           </p:cNvPr>
@@ -7112,7 +7112,7 @@
           <p:cNvPr id="137" name="Rectángulo 136">
             <a:extLst>
               <a:ext uri="{FF2B5EF4-FFF2-40B4-BE49-F238E27FC236}">
-                <a16:creationId xmlns="" xmlns:a16="http://schemas.microsoft.com/office/drawing/2014/main" id="{4431FD59-9C6C-4FD4-A087-B445A8EF6FDF}"/>
+                <a16:creationId xmlns:a16="http://schemas.microsoft.com/office/drawing/2014/main" xmlns="" id="{4431FD59-9C6C-4FD4-A087-B445A8EF6FDF}"/>
               </a:ext>
             </a:extLst>
           </p:cNvPr>
@@ -7164,7 +7164,7 @@
           <p:cNvPr id="138" name="Rectángulo 137">
             <a:extLst>
               <a:ext uri="{FF2B5EF4-FFF2-40B4-BE49-F238E27FC236}">
-                <a16:creationId xmlns="" xmlns:a16="http://schemas.microsoft.com/office/drawing/2014/main" id="{831ABC75-3734-44DE-B678-F9A08F453CA9}"/>
+                <a16:creationId xmlns:a16="http://schemas.microsoft.com/office/drawing/2014/main" xmlns="" id="{831ABC75-3734-44DE-B678-F9A08F453CA9}"/>
               </a:ext>
             </a:extLst>
           </p:cNvPr>
@@ -7216,7 +7216,7 @@
           <p:cNvPr id="139" name="Rectángulo 138">
             <a:extLst>
               <a:ext uri="{FF2B5EF4-FFF2-40B4-BE49-F238E27FC236}">
-                <a16:creationId xmlns="" xmlns:a16="http://schemas.microsoft.com/office/drawing/2014/main" id="{6747C598-6F27-48F6-8699-DE71CA8AAC56}"/>
+                <a16:creationId xmlns:a16="http://schemas.microsoft.com/office/drawing/2014/main" xmlns="" id="{6747C598-6F27-48F6-8699-DE71CA8AAC56}"/>
               </a:ext>
             </a:extLst>
           </p:cNvPr>
@@ -7268,7 +7268,7 @@
           <p:cNvPr id="140" name="Rectángulo 139">
             <a:extLst>
               <a:ext uri="{FF2B5EF4-FFF2-40B4-BE49-F238E27FC236}">
-                <a16:creationId xmlns="" xmlns:a16="http://schemas.microsoft.com/office/drawing/2014/main" id="{C847B380-C1D4-4340-AFA5-431A25138A62}"/>
+                <a16:creationId xmlns:a16="http://schemas.microsoft.com/office/drawing/2014/main" xmlns="" id="{C847B380-C1D4-4340-AFA5-431A25138A62}"/>
               </a:ext>
             </a:extLst>
           </p:cNvPr>
@@ -7320,7 +7320,7 @@
           <p:cNvPr id="141" name="Rectángulo 140">
             <a:extLst>
               <a:ext uri="{FF2B5EF4-FFF2-40B4-BE49-F238E27FC236}">
-                <a16:creationId xmlns="" xmlns:a16="http://schemas.microsoft.com/office/drawing/2014/main" id="{E7925BD4-0E84-4AC6-9E38-CD5780EE73A7}"/>
+                <a16:creationId xmlns:a16="http://schemas.microsoft.com/office/drawing/2014/main" xmlns="" id="{E7925BD4-0E84-4AC6-9E38-CD5780EE73A7}"/>
               </a:ext>
             </a:extLst>
           </p:cNvPr>
@@ -7372,7 +7372,7 @@
           <p:cNvPr id="147" name="Rectángulo 146">
             <a:extLst>
               <a:ext uri="{FF2B5EF4-FFF2-40B4-BE49-F238E27FC236}">
-                <a16:creationId xmlns="" xmlns:a16="http://schemas.microsoft.com/office/drawing/2014/main" id="{2A8C2ECE-5ECC-4C5D-85C5-B01FE7E065E5}"/>
+                <a16:creationId xmlns:a16="http://schemas.microsoft.com/office/drawing/2014/main" xmlns="" id="{2A8C2ECE-5ECC-4C5D-85C5-B01FE7E065E5}"/>
               </a:ext>
             </a:extLst>
           </p:cNvPr>
@@ -7424,7 +7424,7 @@
           <p:cNvPr id="151" name="Rectángulo 150">
             <a:extLst>
               <a:ext uri="{FF2B5EF4-FFF2-40B4-BE49-F238E27FC236}">
-                <a16:creationId xmlns="" xmlns:a16="http://schemas.microsoft.com/office/drawing/2014/main" id="{39BED3B9-5161-4238-A6B4-E73C2313BF03}"/>
+                <a16:creationId xmlns:a16="http://schemas.microsoft.com/office/drawing/2014/main" xmlns="" id="{39BED3B9-5161-4238-A6B4-E73C2313BF03}"/>
               </a:ext>
             </a:extLst>
           </p:cNvPr>
@@ -7476,7 +7476,7 @@
           <p:cNvPr id="152" name="Conector recto 151">
             <a:extLst>
               <a:ext uri="{FF2B5EF4-FFF2-40B4-BE49-F238E27FC236}">
-                <a16:creationId xmlns="" xmlns:a16="http://schemas.microsoft.com/office/drawing/2014/main" id="{7E9F22F7-742E-4F2E-ABEF-67ECBC1C0BB1}"/>
+                <a16:creationId xmlns:a16="http://schemas.microsoft.com/office/drawing/2014/main" xmlns="" id="{7E9F22F7-742E-4F2E-ABEF-67ECBC1C0BB1}"/>
               </a:ext>
             </a:extLst>
           </p:cNvPr>
@@ -7519,7 +7519,7 @@
           <p:cNvPr id="156" name="Conector recto 155">
             <a:extLst>
               <a:ext uri="{FF2B5EF4-FFF2-40B4-BE49-F238E27FC236}">
-                <a16:creationId xmlns="" xmlns:a16="http://schemas.microsoft.com/office/drawing/2014/main" id="{ADE4CF5E-7706-4075-9EBC-713026A07A99}"/>
+                <a16:creationId xmlns:a16="http://schemas.microsoft.com/office/drawing/2014/main" xmlns="" id="{ADE4CF5E-7706-4075-9EBC-713026A07A99}"/>
               </a:ext>
             </a:extLst>
           </p:cNvPr>
@@ -7562,7 +7562,7 @@
           <p:cNvPr id="158" name="Conector recto de flecha 157">
             <a:extLst>
               <a:ext uri="{FF2B5EF4-FFF2-40B4-BE49-F238E27FC236}">
-                <a16:creationId xmlns="" xmlns:a16="http://schemas.microsoft.com/office/drawing/2014/main" id="{E462C51E-1902-4E27-A25A-6B3B8509589C}"/>
+                <a16:creationId xmlns:a16="http://schemas.microsoft.com/office/drawing/2014/main" xmlns="" id="{E462C51E-1902-4E27-A25A-6B3B8509589C}"/>
               </a:ext>
             </a:extLst>
           </p:cNvPr>
@@ -7604,7 +7604,7 @@
           <p:cNvPr id="160" name="Conector recto de flecha 159">
             <a:extLst>
               <a:ext uri="{FF2B5EF4-FFF2-40B4-BE49-F238E27FC236}">
-                <a16:creationId xmlns="" xmlns:a16="http://schemas.microsoft.com/office/drawing/2014/main" id="{2EEE090E-2E31-4BF1-976D-E3FD7FD7BB67}"/>
+                <a16:creationId xmlns:a16="http://schemas.microsoft.com/office/drawing/2014/main" xmlns="" id="{2EEE090E-2E31-4BF1-976D-E3FD7FD7BB67}"/>
               </a:ext>
             </a:extLst>
           </p:cNvPr>
@@ -7646,7 +7646,7 @@
           <p:cNvPr id="162" name="Conector recto 161">
             <a:extLst>
               <a:ext uri="{FF2B5EF4-FFF2-40B4-BE49-F238E27FC236}">
-                <a16:creationId xmlns="" xmlns:a16="http://schemas.microsoft.com/office/drawing/2014/main" id="{72A94A24-0428-400E-8F53-1E6C7C368BFC}"/>
+                <a16:creationId xmlns:a16="http://schemas.microsoft.com/office/drawing/2014/main" xmlns="" id="{72A94A24-0428-400E-8F53-1E6C7C368BFC}"/>
               </a:ext>
             </a:extLst>
           </p:cNvPr>
@@ -7689,7 +7689,7 @@
           <p:cNvPr id="163" name="CuadroTexto 162">
             <a:extLst>
               <a:ext uri="{FF2B5EF4-FFF2-40B4-BE49-F238E27FC236}">
-                <a16:creationId xmlns="" xmlns:a16="http://schemas.microsoft.com/office/drawing/2014/main" id="{A447CBF8-295A-4EB8-BE3C-DB2C86627377}"/>
+                <a16:creationId xmlns:a16="http://schemas.microsoft.com/office/drawing/2014/main" xmlns="" id="{A447CBF8-295A-4EB8-BE3C-DB2C86627377}"/>
               </a:ext>
             </a:extLst>
           </p:cNvPr>
@@ -7725,7 +7725,7 @@
           <p:cNvPr id="164" name="CuadroTexto 163">
             <a:extLst>
               <a:ext uri="{FF2B5EF4-FFF2-40B4-BE49-F238E27FC236}">
-                <a16:creationId xmlns="" xmlns:a16="http://schemas.microsoft.com/office/drawing/2014/main" id="{17A3A88F-AEAD-46DE-A3B5-BD5151511C03}"/>
+                <a16:creationId xmlns:a16="http://schemas.microsoft.com/office/drawing/2014/main" xmlns="" id="{17A3A88F-AEAD-46DE-A3B5-BD5151511C03}"/>
               </a:ext>
             </a:extLst>
           </p:cNvPr>
@@ -7770,7 +7770,7 @@
           <p:cNvPr id="165" name="CuadroTexto 164">
             <a:extLst>
               <a:ext uri="{FF2B5EF4-FFF2-40B4-BE49-F238E27FC236}">
-                <a16:creationId xmlns="" xmlns:a16="http://schemas.microsoft.com/office/drawing/2014/main" id="{E3051239-9AF1-42B5-B808-D697445F69F3}"/>
+                <a16:creationId xmlns:a16="http://schemas.microsoft.com/office/drawing/2014/main" xmlns="" id="{E3051239-9AF1-42B5-B808-D697445F69F3}"/>
               </a:ext>
             </a:extLst>
           </p:cNvPr>
@@ -7813,7 +7813,7 @@
           <p:cNvPr id="166" name="CuadroTexto 165">
             <a:extLst>
               <a:ext uri="{FF2B5EF4-FFF2-40B4-BE49-F238E27FC236}">
-                <a16:creationId xmlns="" xmlns:a16="http://schemas.microsoft.com/office/drawing/2014/main" id="{630684B5-FECF-4D6E-9125-3E66582C6529}"/>
+                <a16:creationId xmlns:a16="http://schemas.microsoft.com/office/drawing/2014/main" xmlns="" id="{630684B5-FECF-4D6E-9125-3E66582C6529}"/>
               </a:ext>
             </a:extLst>
           </p:cNvPr>
@@ -7854,7 +7854,7 @@
           <p:cNvPr id="169" name="CuadroTexto 168">
             <a:extLst>
               <a:ext uri="{FF2B5EF4-FFF2-40B4-BE49-F238E27FC236}">
-                <a16:creationId xmlns="" xmlns:a16="http://schemas.microsoft.com/office/drawing/2014/main" id="{0C17D9FD-88A0-4C7D-974A-8AA5C997A50B}"/>
+                <a16:creationId xmlns:a16="http://schemas.microsoft.com/office/drawing/2014/main" xmlns="" id="{0C17D9FD-88A0-4C7D-974A-8AA5C997A50B}"/>
               </a:ext>
             </a:extLst>
           </p:cNvPr>
@@ -7890,7 +7890,7 @@
           <p:cNvPr id="170" name="CuadroTexto 169">
             <a:extLst>
               <a:ext uri="{FF2B5EF4-FFF2-40B4-BE49-F238E27FC236}">
-                <a16:creationId xmlns="" xmlns:a16="http://schemas.microsoft.com/office/drawing/2014/main" id="{439BC4A8-140F-4E0A-AAC6-205EFE14EB9D}"/>
+                <a16:creationId xmlns:a16="http://schemas.microsoft.com/office/drawing/2014/main" xmlns="" id="{439BC4A8-140F-4E0A-AAC6-205EFE14EB9D}"/>
               </a:ext>
             </a:extLst>
           </p:cNvPr>
@@ -7933,7 +7933,7 @@
     </p:spTree>
     <p:extLst>
       <p:ext uri="{BB962C8B-B14F-4D97-AF65-F5344CB8AC3E}">
-        <p14:creationId xmlns="" xmlns:p14="http://schemas.microsoft.com/office/powerpoint/2010/main" val="2376407795"/>
+        <p14:creationId xmlns:p14="http://schemas.microsoft.com/office/powerpoint/2010/main" xmlns="" val="2376407795"/>
       </p:ext>
     </p:extLst>
   </p:cSld>
@@ -7965,7 +7965,7 @@
           <p:cNvPr id="27" name="36 Conector">
             <a:extLst>
               <a:ext uri="{FF2B5EF4-FFF2-40B4-BE49-F238E27FC236}">
-                <a16:creationId xmlns:a16="http://schemas.microsoft.com/office/drawing/2014/main" xmlns="" id="{11CC1446-9291-450E-9B53-2A15F8DBEF08}"/>
+                <a16:creationId xmlns="" xmlns:a16="http://schemas.microsoft.com/office/drawing/2014/main" id="{11CC1446-9291-450E-9B53-2A15F8DBEF08}"/>
               </a:ext>
             </a:extLst>
           </p:cNvPr>
@@ -8017,7 +8017,7 @@
           <p:cNvPr id="30" name="16 Decisión">
             <a:extLst>
               <a:ext uri="{FF2B5EF4-FFF2-40B4-BE49-F238E27FC236}">
-                <a16:creationId xmlns:a16="http://schemas.microsoft.com/office/drawing/2014/main" xmlns="" id="{FD2C65EB-311B-4CBC-A411-E81D45AF1666}"/>
+                <a16:creationId xmlns="" xmlns:a16="http://schemas.microsoft.com/office/drawing/2014/main" id="{FD2C65EB-311B-4CBC-A411-E81D45AF1666}"/>
               </a:ext>
             </a:extLst>
           </p:cNvPr>
@@ -8075,7 +8075,7 @@
           <p:cNvPr id="46" name="30 CuadroTexto">
             <a:extLst>
               <a:ext uri="{FF2B5EF4-FFF2-40B4-BE49-F238E27FC236}">
-                <a16:creationId xmlns:a16="http://schemas.microsoft.com/office/drawing/2014/main" xmlns="" id="{4C0646B8-2B7E-4579-AEF8-C28BED180070}"/>
+                <a16:creationId xmlns="" xmlns:a16="http://schemas.microsoft.com/office/drawing/2014/main" id="{4C0646B8-2B7E-4579-AEF8-C28BED180070}"/>
               </a:ext>
             </a:extLst>
           </p:cNvPr>
@@ -8112,7 +8112,7 @@
           <p:cNvPr id="2" name="19 Grupo">
             <a:extLst>
               <a:ext uri="{FF2B5EF4-FFF2-40B4-BE49-F238E27FC236}">
-                <a16:creationId xmlns:a16="http://schemas.microsoft.com/office/drawing/2014/main" xmlns="" id="{72728B6F-9E0E-4855-9B6A-D98006B948B6}"/>
+                <a16:creationId xmlns="" xmlns:a16="http://schemas.microsoft.com/office/drawing/2014/main" id="{72728B6F-9E0E-4855-9B6A-D98006B948B6}"/>
               </a:ext>
             </a:extLst>
           </p:cNvPr>
@@ -8132,7 +8132,7 @@
             <p:cNvPr id="53" name="42 Conector">
               <a:extLst>
                 <a:ext uri="{FF2B5EF4-FFF2-40B4-BE49-F238E27FC236}">
-                  <a16:creationId xmlns:a16="http://schemas.microsoft.com/office/drawing/2014/main" xmlns="" id="{373A1267-C09A-4344-AB04-4D134201A6BE}"/>
+                  <a16:creationId xmlns="" xmlns:a16="http://schemas.microsoft.com/office/drawing/2014/main" id="{373A1267-C09A-4344-AB04-4D134201A6BE}"/>
                 </a:ext>
               </a:extLst>
             </p:cNvPr>
@@ -8189,7 +8189,7 @@
             <p:cNvPr id="54" name="43 Conector">
               <a:extLst>
                 <a:ext uri="{FF2B5EF4-FFF2-40B4-BE49-F238E27FC236}">
-                  <a16:creationId xmlns:a16="http://schemas.microsoft.com/office/drawing/2014/main" xmlns="" id="{63920072-F0D4-437F-AAD7-67A75B8A9057}"/>
+                  <a16:creationId xmlns="" xmlns:a16="http://schemas.microsoft.com/office/drawing/2014/main" id="{63920072-F0D4-437F-AAD7-67A75B8A9057}"/>
                 </a:ext>
               </a:extLst>
             </p:cNvPr>
@@ -8244,7 +8244,7 @@
           <p:cNvPr id="47" name="20 Rectángulo redondeado">
             <a:extLst>
               <a:ext uri="{FF2B5EF4-FFF2-40B4-BE49-F238E27FC236}">
-                <a16:creationId xmlns:a16="http://schemas.microsoft.com/office/drawing/2014/main" xmlns="" id="{7938FCD4-2AEB-4A9C-BFA6-FF58F425573D}"/>
+                <a16:creationId xmlns="" xmlns:a16="http://schemas.microsoft.com/office/drawing/2014/main" id="{7938FCD4-2AEB-4A9C-BFA6-FF58F425573D}"/>
               </a:ext>
             </a:extLst>
           </p:cNvPr>
@@ -8312,7 +8312,7 @@
           <p:cNvPr id="52" name="20 Rectángulo redondeado">
             <a:extLst>
               <a:ext uri="{FF2B5EF4-FFF2-40B4-BE49-F238E27FC236}">
-                <a16:creationId xmlns:a16="http://schemas.microsoft.com/office/drawing/2014/main" xmlns="" id="{7938FCD4-2AEB-4A9C-BFA6-FF58F425573D}"/>
+                <a16:creationId xmlns="" xmlns:a16="http://schemas.microsoft.com/office/drawing/2014/main" id="{7938FCD4-2AEB-4A9C-BFA6-FF58F425573D}"/>
               </a:ext>
             </a:extLst>
           </p:cNvPr>
@@ -8380,7 +8380,7 @@
           <p:cNvPr id="83" name="16 Decisión">
             <a:extLst>
               <a:ext uri="{FF2B5EF4-FFF2-40B4-BE49-F238E27FC236}">
-                <a16:creationId xmlns:a16="http://schemas.microsoft.com/office/drawing/2014/main" xmlns="" id="{FD2C65EB-311B-4CBC-A411-E81D45AF1666}"/>
+                <a16:creationId xmlns="" xmlns:a16="http://schemas.microsoft.com/office/drawing/2014/main" id="{FD2C65EB-311B-4CBC-A411-E81D45AF1666}"/>
               </a:ext>
             </a:extLst>
           </p:cNvPr>
@@ -8438,7 +8438,7 @@
           <p:cNvPr id="86" name="30 CuadroTexto">
             <a:extLst>
               <a:ext uri="{FF2B5EF4-FFF2-40B4-BE49-F238E27FC236}">
-                <a16:creationId xmlns:a16="http://schemas.microsoft.com/office/drawing/2014/main" xmlns="" id="{4C0646B8-2B7E-4579-AEF8-C28BED180070}"/>
+                <a16:creationId xmlns="" xmlns:a16="http://schemas.microsoft.com/office/drawing/2014/main" id="{4C0646B8-2B7E-4579-AEF8-C28BED180070}"/>
               </a:ext>
             </a:extLst>
           </p:cNvPr>
@@ -8475,7 +8475,7 @@
           <p:cNvPr id="103" name="30 CuadroTexto">
             <a:extLst>
               <a:ext uri="{FF2B5EF4-FFF2-40B4-BE49-F238E27FC236}">
-                <a16:creationId xmlns:a16="http://schemas.microsoft.com/office/drawing/2014/main" xmlns="" id="{6FAC7A1A-4EE0-4C6E-8C57-737F69FEEA58}"/>
+                <a16:creationId xmlns="" xmlns:a16="http://schemas.microsoft.com/office/drawing/2014/main" id="{6FAC7A1A-4EE0-4C6E-8C57-737F69FEEA58}"/>
               </a:ext>
             </a:extLst>
           </p:cNvPr>
@@ -8548,7 +8548,7 @@
           <p:cNvPr id="76" name="20 Rectángulo redondeado">
             <a:extLst>
               <a:ext uri="{FF2B5EF4-FFF2-40B4-BE49-F238E27FC236}">
-                <a16:creationId xmlns:a16="http://schemas.microsoft.com/office/drawing/2014/main" xmlns="" id="{7938FCD4-2AEB-4A9C-BFA6-FF58F425573D}"/>
+                <a16:creationId xmlns="" xmlns:a16="http://schemas.microsoft.com/office/drawing/2014/main" id="{7938FCD4-2AEB-4A9C-BFA6-FF58F425573D}"/>
               </a:ext>
             </a:extLst>
           </p:cNvPr>
@@ -8616,7 +8616,7 @@
           <p:cNvPr id="77" name="20 Rectángulo redondeado">
             <a:extLst>
               <a:ext uri="{FF2B5EF4-FFF2-40B4-BE49-F238E27FC236}">
-                <a16:creationId xmlns:a16="http://schemas.microsoft.com/office/drawing/2014/main" xmlns="" id="{7938FCD4-2AEB-4A9C-BFA6-FF58F425573D}"/>
+                <a16:creationId xmlns="" xmlns:a16="http://schemas.microsoft.com/office/drawing/2014/main" id="{7938FCD4-2AEB-4A9C-BFA6-FF58F425573D}"/>
               </a:ext>
             </a:extLst>
           </p:cNvPr>
@@ -8684,7 +8684,7 @@
           <p:cNvPr id="3" name="19 Grupo">
             <a:extLst>
               <a:ext uri="{FF2B5EF4-FFF2-40B4-BE49-F238E27FC236}">
-                <a16:creationId xmlns:a16="http://schemas.microsoft.com/office/drawing/2014/main" xmlns="" id="{72728B6F-9E0E-4855-9B6A-D98006B948B6}"/>
+                <a16:creationId xmlns="" xmlns:a16="http://schemas.microsoft.com/office/drawing/2014/main" id="{72728B6F-9E0E-4855-9B6A-D98006B948B6}"/>
               </a:ext>
             </a:extLst>
           </p:cNvPr>
@@ -8704,7 +8704,7 @@
             <p:cNvPr id="80" name="42 Conector">
               <a:extLst>
                 <a:ext uri="{FF2B5EF4-FFF2-40B4-BE49-F238E27FC236}">
-                  <a16:creationId xmlns:a16="http://schemas.microsoft.com/office/drawing/2014/main" xmlns="" id="{373A1267-C09A-4344-AB04-4D134201A6BE}"/>
+                  <a16:creationId xmlns="" xmlns:a16="http://schemas.microsoft.com/office/drawing/2014/main" id="{373A1267-C09A-4344-AB04-4D134201A6BE}"/>
                 </a:ext>
               </a:extLst>
             </p:cNvPr>
@@ -8761,7 +8761,7 @@
             <p:cNvPr id="82" name="43 Conector">
               <a:extLst>
                 <a:ext uri="{FF2B5EF4-FFF2-40B4-BE49-F238E27FC236}">
-                  <a16:creationId xmlns:a16="http://schemas.microsoft.com/office/drawing/2014/main" xmlns="" id="{63920072-F0D4-437F-AAD7-67A75B8A9057}"/>
+                  <a16:creationId xmlns="" xmlns:a16="http://schemas.microsoft.com/office/drawing/2014/main" id="{63920072-F0D4-437F-AAD7-67A75B8A9057}"/>
                 </a:ext>
               </a:extLst>
             </p:cNvPr>
@@ -8816,7 +8816,7 @@
           <p:cNvPr id="87" name="16 Decisión">
             <a:extLst>
               <a:ext uri="{FF2B5EF4-FFF2-40B4-BE49-F238E27FC236}">
-                <a16:creationId xmlns:a16="http://schemas.microsoft.com/office/drawing/2014/main" xmlns="" id="{FD2C65EB-311B-4CBC-A411-E81D45AF1666}"/>
+                <a16:creationId xmlns="" xmlns:a16="http://schemas.microsoft.com/office/drawing/2014/main" id="{FD2C65EB-311B-4CBC-A411-E81D45AF1666}"/>
               </a:ext>
             </a:extLst>
           </p:cNvPr>
@@ -8874,7 +8874,7 @@
           <p:cNvPr id="4" name="19 Grupo">
             <a:extLst>
               <a:ext uri="{FF2B5EF4-FFF2-40B4-BE49-F238E27FC236}">
-                <a16:creationId xmlns:a16="http://schemas.microsoft.com/office/drawing/2014/main" xmlns="" id="{72728B6F-9E0E-4855-9B6A-D98006B948B6}"/>
+                <a16:creationId xmlns="" xmlns:a16="http://schemas.microsoft.com/office/drawing/2014/main" id="{72728B6F-9E0E-4855-9B6A-D98006B948B6}"/>
               </a:ext>
             </a:extLst>
           </p:cNvPr>
@@ -8894,7 +8894,7 @@
             <p:cNvPr id="108" name="42 Conector">
               <a:extLst>
                 <a:ext uri="{FF2B5EF4-FFF2-40B4-BE49-F238E27FC236}">
-                  <a16:creationId xmlns:a16="http://schemas.microsoft.com/office/drawing/2014/main" xmlns="" id="{373A1267-C09A-4344-AB04-4D134201A6BE}"/>
+                  <a16:creationId xmlns="" xmlns:a16="http://schemas.microsoft.com/office/drawing/2014/main" id="{373A1267-C09A-4344-AB04-4D134201A6BE}"/>
                 </a:ext>
               </a:extLst>
             </p:cNvPr>
@@ -8951,7 +8951,7 @@
             <p:cNvPr id="112" name="43 Conector">
               <a:extLst>
                 <a:ext uri="{FF2B5EF4-FFF2-40B4-BE49-F238E27FC236}">
-                  <a16:creationId xmlns:a16="http://schemas.microsoft.com/office/drawing/2014/main" xmlns="" id="{63920072-F0D4-437F-AAD7-67A75B8A9057}"/>
+                  <a16:creationId xmlns="" xmlns:a16="http://schemas.microsoft.com/office/drawing/2014/main" id="{63920072-F0D4-437F-AAD7-67A75B8A9057}"/>
                 </a:ext>
               </a:extLst>
             </p:cNvPr>
@@ -9006,7 +9006,7 @@
           <p:cNvPr id="113" name="30 CuadroTexto">
             <a:extLst>
               <a:ext uri="{FF2B5EF4-FFF2-40B4-BE49-F238E27FC236}">
-                <a16:creationId xmlns:a16="http://schemas.microsoft.com/office/drawing/2014/main" xmlns="" id="{4C0646B8-2B7E-4579-AEF8-C28BED180070}"/>
+                <a16:creationId xmlns="" xmlns:a16="http://schemas.microsoft.com/office/drawing/2014/main" id="{4C0646B8-2B7E-4579-AEF8-C28BED180070}"/>
               </a:ext>
             </a:extLst>
           </p:cNvPr>
@@ -9043,7 +9043,7 @@
           <p:cNvPr id="114" name="20 Rectángulo redondeado">
             <a:extLst>
               <a:ext uri="{FF2B5EF4-FFF2-40B4-BE49-F238E27FC236}">
-                <a16:creationId xmlns:a16="http://schemas.microsoft.com/office/drawing/2014/main" xmlns="" id="{7938FCD4-2AEB-4A9C-BFA6-FF58F425573D}"/>
+                <a16:creationId xmlns="" xmlns:a16="http://schemas.microsoft.com/office/drawing/2014/main" id="{7938FCD4-2AEB-4A9C-BFA6-FF58F425573D}"/>
               </a:ext>
             </a:extLst>
           </p:cNvPr>
@@ -9111,7 +9111,7 @@
           <p:cNvPr id="115" name="20 Rectángulo redondeado">
             <a:extLst>
               <a:ext uri="{FF2B5EF4-FFF2-40B4-BE49-F238E27FC236}">
-                <a16:creationId xmlns:a16="http://schemas.microsoft.com/office/drawing/2014/main" xmlns="" id="{7938FCD4-2AEB-4A9C-BFA6-FF58F425573D}"/>
+                <a16:creationId xmlns="" xmlns:a16="http://schemas.microsoft.com/office/drawing/2014/main" id="{7938FCD4-2AEB-4A9C-BFA6-FF58F425573D}"/>
               </a:ext>
             </a:extLst>
           </p:cNvPr>
@@ -9179,7 +9179,7 @@
           <p:cNvPr id="5" name="19 Grupo">
             <a:extLst>
               <a:ext uri="{FF2B5EF4-FFF2-40B4-BE49-F238E27FC236}">
-                <a16:creationId xmlns:a16="http://schemas.microsoft.com/office/drawing/2014/main" xmlns="" id="{72728B6F-9E0E-4855-9B6A-D98006B948B6}"/>
+                <a16:creationId xmlns="" xmlns:a16="http://schemas.microsoft.com/office/drawing/2014/main" id="{72728B6F-9E0E-4855-9B6A-D98006B948B6}"/>
               </a:ext>
             </a:extLst>
           </p:cNvPr>
@@ -9199,7 +9199,7 @@
             <p:cNvPr id="57" name="42 Conector">
               <a:extLst>
                 <a:ext uri="{FF2B5EF4-FFF2-40B4-BE49-F238E27FC236}">
-                  <a16:creationId xmlns:a16="http://schemas.microsoft.com/office/drawing/2014/main" xmlns="" id="{373A1267-C09A-4344-AB04-4D134201A6BE}"/>
+                  <a16:creationId xmlns="" xmlns:a16="http://schemas.microsoft.com/office/drawing/2014/main" id="{373A1267-C09A-4344-AB04-4D134201A6BE}"/>
                 </a:ext>
               </a:extLst>
             </p:cNvPr>
@@ -9256,7 +9256,7 @@
             <p:cNvPr id="58" name="43 Conector">
               <a:extLst>
                 <a:ext uri="{FF2B5EF4-FFF2-40B4-BE49-F238E27FC236}">
-                  <a16:creationId xmlns:a16="http://schemas.microsoft.com/office/drawing/2014/main" xmlns="" id="{63920072-F0D4-437F-AAD7-67A75B8A9057}"/>
+                  <a16:creationId xmlns="" xmlns:a16="http://schemas.microsoft.com/office/drawing/2014/main" id="{63920072-F0D4-437F-AAD7-67A75B8A9057}"/>
                 </a:ext>
               </a:extLst>
             </p:cNvPr>
@@ -9349,7 +9349,7 @@
           <p:cNvPr id="72" name="29 Conector recto de flecha">
             <a:extLst>
               <a:ext uri="{FF2B5EF4-FFF2-40B4-BE49-F238E27FC236}">
-                <a16:creationId xmlns:a16="http://schemas.microsoft.com/office/drawing/2014/main" xmlns="" id="{E051F635-5666-428C-91BF-EB77E088BD3E}"/>
+                <a16:creationId xmlns="" xmlns:a16="http://schemas.microsoft.com/office/drawing/2014/main" id="{E051F635-5666-428C-91BF-EB77E088BD3E}"/>
               </a:ext>
             </a:extLst>
           </p:cNvPr>
@@ -9392,7 +9392,7 @@
           <p:cNvPr id="73" name="30 CuadroTexto">
             <a:extLst>
               <a:ext uri="{FF2B5EF4-FFF2-40B4-BE49-F238E27FC236}">
-                <a16:creationId xmlns:a16="http://schemas.microsoft.com/office/drawing/2014/main" xmlns="" id="{5B67840B-D3E7-4642-A33C-52505043E768}"/>
+                <a16:creationId xmlns="" xmlns:a16="http://schemas.microsoft.com/office/drawing/2014/main" id="{5B67840B-D3E7-4642-A33C-52505043E768}"/>
               </a:ext>
             </a:extLst>
           </p:cNvPr>
@@ -9427,7 +9427,7 @@
           <p:cNvPr id="74" name="29 Conector recto de flecha">
             <a:extLst>
               <a:ext uri="{FF2B5EF4-FFF2-40B4-BE49-F238E27FC236}">
-                <a16:creationId xmlns:a16="http://schemas.microsoft.com/office/drawing/2014/main" xmlns="" id="{E051F635-5666-428C-91BF-EB77E088BD3E}"/>
+                <a16:creationId xmlns="" xmlns:a16="http://schemas.microsoft.com/office/drawing/2014/main" id="{E051F635-5666-428C-91BF-EB77E088BD3E}"/>
               </a:ext>
             </a:extLst>
           </p:cNvPr>
@@ -9470,7 +9470,7 @@
           <p:cNvPr id="75" name="30 CuadroTexto">
             <a:extLst>
               <a:ext uri="{FF2B5EF4-FFF2-40B4-BE49-F238E27FC236}">
-                <a16:creationId xmlns:a16="http://schemas.microsoft.com/office/drawing/2014/main" xmlns="" id="{5B67840B-D3E7-4642-A33C-52505043E768}"/>
+                <a16:creationId xmlns="" xmlns:a16="http://schemas.microsoft.com/office/drawing/2014/main" id="{5B67840B-D3E7-4642-A33C-52505043E768}"/>
               </a:ext>
             </a:extLst>
           </p:cNvPr>
@@ -9505,7 +9505,7 @@
           <p:cNvPr id="78" name="29 Conector recto de flecha">
             <a:extLst>
               <a:ext uri="{FF2B5EF4-FFF2-40B4-BE49-F238E27FC236}">
-                <a16:creationId xmlns:a16="http://schemas.microsoft.com/office/drawing/2014/main" xmlns="" id="{E051F635-5666-428C-91BF-EB77E088BD3E}"/>
+                <a16:creationId xmlns="" xmlns:a16="http://schemas.microsoft.com/office/drawing/2014/main" id="{E051F635-5666-428C-91BF-EB77E088BD3E}"/>
               </a:ext>
             </a:extLst>
           </p:cNvPr>
@@ -9548,7 +9548,7 @@
           <p:cNvPr id="79" name="30 CuadroTexto">
             <a:extLst>
               <a:ext uri="{FF2B5EF4-FFF2-40B4-BE49-F238E27FC236}">
-                <a16:creationId xmlns:a16="http://schemas.microsoft.com/office/drawing/2014/main" xmlns="" id="{5B67840B-D3E7-4642-A33C-52505043E768}"/>
+                <a16:creationId xmlns="" xmlns:a16="http://schemas.microsoft.com/office/drawing/2014/main" id="{5B67840B-D3E7-4642-A33C-52505043E768}"/>
               </a:ext>
             </a:extLst>
           </p:cNvPr>
@@ -9621,7 +9621,7 @@
           <p:cNvPr id="100" name="29 Conector recto de flecha">
             <a:extLst>
               <a:ext uri="{FF2B5EF4-FFF2-40B4-BE49-F238E27FC236}">
-                <a16:creationId xmlns:a16="http://schemas.microsoft.com/office/drawing/2014/main" xmlns="" id="{E051F635-5666-428C-91BF-EB77E088BD3E}"/>
+                <a16:creationId xmlns="" xmlns:a16="http://schemas.microsoft.com/office/drawing/2014/main" id="{E051F635-5666-428C-91BF-EB77E088BD3E}"/>
               </a:ext>
             </a:extLst>
           </p:cNvPr>
@@ -9664,7 +9664,7 @@
           <p:cNvPr id="105" name="29 Conector recto de flecha">
             <a:extLst>
               <a:ext uri="{FF2B5EF4-FFF2-40B4-BE49-F238E27FC236}">
-                <a16:creationId xmlns:a16="http://schemas.microsoft.com/office/drawing/2014/main" xmlns="" id="{E051F635-5666-428C-91BF-EB77E088BD3E}"/>
+                <a16:creationId xmlns="" xmlns:a16="http://schemas.microsoft.com/office/drawing/2014/main" id="{E051F635-5666-428C-91BF-EB77E088BD3E}"/>
               </a:ext>
             </a:extLst>
           </p:cNvPr>
@@ -9707,7 +9707,7 @@
           <p:cNvPr id="106" name="29 Conector recto de flecha">
             <a:extLst>
               <a:ext uri="{FF2B5EF4-FFF2-40B4-BE49-F238E27FC236}">
-                <a16:creationId xmlns:a16="http://schemas.microsoft.com/office/drawing/2014/main" xmlns="" id="{E051F635-5666-428C-91BF-EB77E088BD3E}"/>
+                <a16:creationId xmlns="" xmlns:a16="http://schemas.microsoft.com/office/drawing/2014/main" id="{E051F635-5666-428C-91BF-EB77E088BD3E}"/>
               </a:ext>
             </a:extLst>
           </p:cNvPr>
@@ -9750,7 +9750,7 @@
           <p:cNvPr id="109" name="29 Conector recto de flecha">
             <a:extLst>
               <a:ext uri="{FF2B5EF4-FFF2-40B4-BE49-F238E27FC236}">
-                <a16:creationId xmlns:a16="http://schemas.microsoft.com/office/drawing/2014/main" xmlns="" id="{E051F635-5666-428C-91BF-EB77E088BD3E}"/>
+                <a16:creationId xmlns="" xmlns:a16="http://schemas.microsoft.com/office/drawing/2014/main" id="{E051F635-5666-428C-91BF-EB77E088BD3E}"/>
               </a:ext>
             </a:extLst>
           </p:cNvPr>
@@ -9793,7 +9793,7 @@
           <p:cNvPr id="117" name="29 Conector recto de flecha">
             <a:extLst>
               <a:ext uri="{FF2B5EF4-FFF2-40B4-BE49-F238E27FC236}">
-                <a16:creationId xmlns:a16="http://schemas.microsoft.com/office/drawing/2014/main" xmlns="" id="{E051F635-5666-428C-91BF-EB77E088BD3E}"/>
+                <a16:creationId xmlns="" xmlns:a16="http://schemas.microsoft.com/office/drawing/2014/main" id="{E051F635-5666-428C-91BF-EB77E088BD3E}"/>
               </a:ext>
             </a:extLst>
           </p:cNvPr>
@@ -9836,7 +9836,7 @@
           <p:cNvPr id="131" name="30 CuadroTexto">
             <a:extLst>
               <a:ext uri="{FF2B5EF4-FFF2-40B4-BE49-F238E27FC236}">
-                <a16:creationId xmlns:a16="http://schemas.microsoft.com/office/drawing/2014/main" xmlns="" id="{6FAC7A1A-4EE0-4C6E-8C57-737F69FEEA58}"/>
+                <a16:creationId xmlns="" xmlns:a16="http://schemas.microsoft.com/office/drawing/2014/main" id="{6FAC7A1A-4EE0-4C6E-8C57-737F69FEEA58}"/>
               </a:ext>
             </a:extLst>
           </p:cNvPr>
@@ -9871,7 +9871,7 @@
           <p:cNvPr id="132" name="30 CuadroTexto">
             <a:extLst>
               <a:ext uri="{FF2B5EF4-FFF2-40B4-BE49-F238E27FC236}">
-                <a16:creationId xmlns:a16="http://schemas.microsoft.com/office/drawing/2014/main" xmlns="" id="{6FAC7A1A-4EE0-4C6E-8C57-737F69FEEA58}"/>
+                <a16:creationId xmlns="" xmlns:a16="http://schemas.microsoft.com/office/drawing/2014/main" id="{6FAC7A1A-4EE0-4C6E-8C57-737F69FEEA58}"/>
               </a:ext>
             </a:extLst>
           </p:cNvPr>
@@ -9931,7 +9931,7 @@
           <p:cNvPr id="93" name="20 Rectángulo redondeado">
             <a:extLst>
               <a:ext uri="{FF2B5EF4-FFF2-40B4-BE49-F238E27FC236}">
-                <a16:creationId xmlns:a16="http://schemas.microsoft.com/office/drawing/2014/main" xmlns="" id="{7938FCD4-2AEB-4A9C-BFA6-FF58F425573D}"/>
+                <a16:creationId xmlns="" xmlns:a16="http://schemas.microsoft.com/office/drawing/2014/main" id="{7938FCD4-2AEB-4A9C-BFA6-FF58F425573D}"/>
               </a:ext>
             </a:extLst>
           </p:cNvPr>
@@ -9981,22 +9981,14 @@
             <a:pPr algn="ctr"/>
             <a:r>
               <a:rPr lang="es-ES" sz="1200" smtClean="0"/>
-              <a:t>Value64  </a:t>
-            </a:r>
+              <a:t>Value64  =</a:t>
+            </a:r>
+          </a:p>
+          <a:p>
+            <a:pPr algn="ctr"/>
             <a:r>
               <a:rPr lang="es-ES" sz="1200" smtClean="0"/>
-              <a:t>=</a:t>
-            </a:r>
-          </a:p>
-          <a:p>
-            <a:pPr algn="ctr"/>
-            <a:r>
-              <a:rPr lang="es-ES" sz="1200" smtClean="0"/>
-              <a:t>CurrentValue </a:t>
-            </a:r>
-            <a:r>
-              <a:rPr lang="es-ES" sz="1200" smtClean="0"/>
-              <a:t>* 48271</a:t>
+              <a:t>CurrentValue * 48271</a:t>
             </a:r>
             <a:endParaRPr lang="es-ES" sz="1200"/>
           </a:p>
@@ -10007,7 +9999,7 @@
           <p:cNvPr id="98" name="20 Rectángulo redondeado">
             <a:extLst>
               <a:ext uri="{FF2B5EF4-FFF2-40B4-BE49-F238E27FC236}">
-                <a16:creationId xmlns:a16="http://schemas.microsoft.com/office/drawing/2014/main" xmlns="" id="{7938FCD4-2AEB-4A9C-BFA6-FF58F425573D}"/>
+                <a16:creationId xmlns="" xmlns:a16="http://schemas.microsoft.com/office/drawing/2014/main" id="{7938FCD4-2AEB-4A9C-BFA6-FF58F425573D}"/>
               </a:ext>
             </a:extLst>
           </p:cNvPr>
@@ -10057,22 +10049,14 @@
             <a:pPr algn="ctr"/>
             <a:r>
               <a:rPr lang="es-ES" sz="1200" smtClean="0"/>
-              <a:t>CurrentValue  </a:t>
-            </a:r>
+              <a:t>CurrentValue  =</a:t>
+            </a:r>
+          </a:p>
+          <a:p>
+            <a:pPr algn="ctr"/>
             <a:r>
               <a:rPr lang="es-ES" sz="1200" smtClean="0"/>
-              <a:t>=</a:t>
-            </a:r>
-          </a:p>
-          <a:p>
-            <a:pPr algn="ctr"/>
-            <a:r>
-              <a:rPr lang="es-ES" sz="1200" smtClean="0"/>
-              <a:t>Value64  </a:t>
-            </a:r>
-            <a:r>
-              <a:rPr lang="es-ES" sz="1200" smtClean="0"/>
-              <a:t>mod  7FFFFFFFh</a:t>
+              <a:t>Value64  mod  7FFFFFFFh</a:t>
             </a:r>
             <a:endParaRPr lang="es-ES" sz="1200"/>
           </a:p>
@@ -10083,7 +10067,7 @@
           <p:cNvPr id="101" name="19 Grupo">
             <a:extLst>
               <a:ext uri="{FF2B5EF4-FFF2-40B4-BE49-F238E27FC236}">
-                <a16:creationId xmlns:a16="http://schemas.microsoft.com/office/drawing/2014/main" xmlns="" id="{72728B6F-9E0E-4855-9B6A-D98006B948B6}"/>
+                <a16:creationId xmlns="" xmlns:a16="http://schemas.microsoft.com/office/drawing/2014/main" id="{72728B6F-9E0E-4855-9B6A-D98006B948B6}"/>
               </a:ext>
             </a:extLst>
           </p:cNvPr>
@@ -10103,7 +10087,7 @@
             <p:cNvPr id="102" name="42 Conector">
               <a:extLst>
                 <a:ext uri="{FF2B5EF4-FFF2-40B4-BE49-F238E27FC236}">
-                  <a16:creationId xmlns:a16="http://schemas.microsoft.com/office/drawing/2014/main" xmlns="" id="{373A1267-C09A-4344-AB04-4D134201A6BE}"/>
+                  <a16:creationId xmlns="" xmlns:a16="http://schemas.microsoft.com/office/drawing/2014/main" id="{373A1267-C09A-4344-AB04-4D134201A6BE}"/>
                 </a:ext>
               </a:extLst>
             </p:cNvPr>
@@ -10160,7 +10144,7 @@
             <p:cNvPr id="103" name="43 Conector">
               <a:extLst>
                 <a:ext uri="{FF2B5EF4-FFF2-40B4-BE49-F238E27FC236}">
-                  <a16:creationId xmlns:a16="http://schemas.microsoft.com/office/drawing/2014/main" xmlns="" id="{63920072-F0D4-437F-AAD7-67A75B8A9057}"/>
+                  <a16:creationId xmlns="" xmlns:a16="http://schemas.microsoft.com/office/drawing/2014/main" id="{63920072-F0D4-437F-AAD7-67A75B8A9057}"/>
                 </a:ext>
               </a:extLst>
             </p:cNvPr>
@@ -10215,7 +10199,7 @@
           <p:cNvPr id="105" name="36 Conector">
             <a:extLst>
               <a:ext uri="{FF2B5EF4-FFF2-40B4-BE49-F238E27FC236}">
-                <a16:creationId xmlns:a16="http://schemas.microsoft.com/office/drawing/2014/main" xmlns="" id="{11CC1446-9291-450E-9B53-2A15F8DBEF08}"/>
+                <a16:creationId xmlns="" xmlns:a16="http://schemas.microsoft.com/office/drawing/2014/main" id="{11CC1446-9291-450E-9B53-2A15F8DBEF08}"/>
               </a:ext>
             </a:extLst>
           </p:cNvPr>
@@ -10267,7 +10251,7 @@
           <p:cNvPr id="106" name="29 Conector recto de flecha">
             <a:extLst>
               <a:ext uri="{FF2B5EF4-FFF2-40B4-BE49-F238E27FC236}">
-                <a16:creationId xmlns:a16="http://schemas.microsoft.com/office/drawing/2014/main" xmlns="" id="{E051F635-5666-428C-91BF-EB77E088BD3E}"/>
+                <a16:creationId xmlns="" xmlns:a16="http://schemas.microsoft.com/office/drawing/2014/main" id="{E051F635-5666-428C-91BF-EB77E088BD3E}"/>
               </a:ext>
             </a:extLst>
           </p:cNvPr>
@@ -10310,7 +10294,7 @@
           <p:cNvPr id="112" name="29 Conector recto de flecha">
             <a:extLst>
               <a:ext uri="{FF2B5EF4-FFF2-40B4-BE49-F238E27FC236}">
-                <a16:creationId xmlns:a16="http://schemas.microsoft.com/office/drawing/2014/main" xmlns="" id="{E051F635-5666-428C-91BF-EB77E088BD3E}"/>
+                <a16:creationId xmlns="" xmlns:a16="http://schemas.microsoft.com/office/drawing/2014/main" id="{E051F635-5666-428C-91BF-EB77E088BD3E}"/>
               </a:ext>
             </a:extLst>
           </p:cNvPr>
@@ -10353,7 +10337,7 @@
           <p:cNvPr id="113" name="29 Conector recto de flecha">
             <a:extLst>
               <a:ext uri="{FF2B5EF4-FFF2-40B4-BE49-F238E27FC236}">
-                <a16:creationId xmlns:a16="http://schemas.microsoft.com/office/drawing/2014/main" xmlns="" id="{E051F635-5666-428C-91BF-EB77E088BD3E}"/>
+                <a16:creationId xmlns="" xmlns:a16="http://schemas.microsoft.com/office/drawing/2014/main" id="{E051F635-5666-428C-91BF-EB77E088BD3E}"/>
               </a:ext>
             </a:extLst>
           </p:cNvPr>

</xml_diff>